<commit_message>
Updated PPT added to resource folder
</commit_message>
<xml_diff>
--- a/resources/Time_Limit_Exceeded_Edelweiss_Hackathon.pptx
+++ b/resources/Time_Limit_Exceeded_Edelweiss_Hackathon.pptx
@@ -4971,7 +4971,7 @@
         </p:nvGraphicFramePr>
         <p:xfrm>
           <a:off x="1028700" y="2777937"/>
-          <a:ext cx="16258210" cy="5305425"/>
+          <a:ext cx="16258210" cy="6362700"/>
         </p:xfrm>
         <a:graphic>
           <a:graphicData uri="http://schemas.openxmlformats.org/drawingml/2006/table">
@@ -4982,7 +4982,7 @@
                 <a:gridCol w="4612558"/>
                 <a:gridCol w="6226249"/>
               </a:tblGrid>
-              <a:tr h="1061085">
+              <a:tr h="1060450">
                 <a:tc>
                   <a:txBody>
                     <a:bodyPr anchor="t" rtlCol="false"/>
@@ -5179,7 +5179,195 @@
                   </a:tcPr>
                 </a:tc>
               </a:tr>
-              <a:tr h="1061085">
+              <a:tr h="1060450">
+                <a:tc>
+                  <a:txBody>
+                    <a:bodyPr anchor="t" rtlCol="false"/>
+                    <a:lstStyle/>
+                    <a:p>
+                      <a:pPr algn="ctr">
+                        <a:lnSpc>
+                          <a:spcPts val="4480"/>
+                        </a:lnSpc>
+                        <a:defRPr/>
+                      </a:pPr>
+                      <a:r>
+                        <a:rPr lang="en-US" sz="3200">
+                          <a:solidFill>
+                            <a:srgbClr val="0453F1"/>
+                          </a:solidFill>
+                          <a:latin typeface="IBM Plex Sans"/>
+                        </a:rPr>
+                        <a:t>Hardik Panchal</a:t>
+                      </a:r>
+                      <a:endParaRPr lang="en-US" sz="1100"/>
+                    </a:p>
+                  </a:txBody>
+                  <a:tcPr marL="190500" marR="190500" marT="190500" marB="190500" anchor="ctr">
+                    <a:lnL cmpd="sng" algn="ctr" cap="flat" w="19050">
+                      <a:solidFill>
+                        <a:srgbClr val="0453F1"/>
+                      </a:solidFill>
+                      <a:prstDash val="solid"/>
+                      <a:round/>
+                      <a:headEnd type="none" w="med" len="med"/>
+                      <a:tailEnd type="none" w="med" len="med"/>
+                    </a:lnL>
+                    <a:lnR cmpd="sng" algn="ctr" cap="flat" w="19050">
+                      <a:solidFill>
+                        <a:srgbClr val="0453F1"/>
+                      </a:solidFill>
+                      <a:prstDash val="solid"/>
+                      <a:round/>
+                      <a:headEnd type="none" w="med" len="med"/>
+                      <a:tailEnd type="none" w="med" len="med"/>
+                    </a:lnR>
+                    <a:lnT cmpd="sng" algn="ctr" cap="flat" w="19050">
+                      <a:solidFill>
+                        <a:srgbClr val="0453F1"/>
+                      </a:solidFill>
+                      <a:prstDash val="solid"/>
+                      <a:round/>
+                      <a:headEnd type="none" w="med" len="med"/>
+                      <a:tailEnd type="none" w="med" len="med"/>
+                    </a:lnT>
+                    <a:lnB cmpd="sng" algn="ctr" cap="flat" w="19050">
+                      <a:solidFill>
+                        <a:srgbClr val="0453F1"/>
+                      </a:solidFill>
+                      <a:prstDash val="solid"/>
+                      <a:round/>
+                      <a:headEnd type="none" w="med" len="med"/>
+                      <a:tailEnd type="none" w="med" len="med"/>
+                    </a:lnB>
+                  </a:tcPr>
+                </a:tc>
+                <a:tc>
+                  <a:txBody>
+                    <a:bodyPr anchor="t" rtlCol="false"/>
+                    <a:lstStyle/>
+                    <a:p>
+                      <a:pPr algn="ctr">
+                        <a:lnSpc>
+                          <a:spcPts val="4480"/>
+                        </a:lnSpc>
+                        <a:defRPr/>
+                      </a:pPr>
+                      <a:r>
+                        <a:rPr lang="en-US" sz="3200">
+                          <a:solidFill>
+                            <a:srgbClr val="0453F1"/>
+                          </a:solidFill>
+                          <a:latin typeface="IBM Plex Sans"/>
+                        </a:rPr>
+                        <a:t>16010121805</a:t>
+                      </a:r>
+                      <a:endParaRPr lang="en-US" sz="1100"/>
+                    </a:p>
+                  </a:txBody>
+                  <a:tcPr marL="190500" marR="190500" marT="190500" marB="190500" anchor="ctr">
+                    <a:lnL cmpd="sng" algn="ctr" cap="flat" w="19050">
+                      <a:solidFill>
+                        <a:srgbClr val="0453F1"/>
+                      </a:solidFill>
+                      <a:prstDash val="solid"/>
+                      <a:round/>
+                      <a:headEnd type="none" w="med" len="med"/>
+                      <a:tailEnd type="none" w="med" len="med"/>
+                    </a:lnL>
+                    <a:lnR cmpd="sng" algn="ctr" cap="flat" w="19050">
+                      <a:solidFill>
+                        <a:srgbClr val="0453F1"/>
+                      </a:solidFill>
+                      <a:prstDash val="solid"/>
+                      <a:round/>
+                      <a:headEnd type="none" w="med" len="med"/>
+                      <a:tailEnd type="none" w="med" len="med"/>
+                    </a:lnR>
+                    <a:lnT cmpd="sng" algn="ctr" cap="flat" w="19050">
+                      <a:solidFill>
+                        <a:srgbClr val="0453F1"/>
+                      </a:solidFill>
+                      <a:prstDash val="solid"/>
+                      <a:round/>
+                      <a:headEnd type="none" w="med" len="med"/>
+                      <a:tailEnd type="none" w="med" len="med"/>
+                    </a:lnT>
+                    <a:lnB cmpd="sng" algn="ctr" cap="flat" w="19050">
+                      <a:solidFill>
+                        <a:srgbClr val="0453F1"/>
+                      </a:solidFill>
+                      <a:prstDash val="solid"/>
+                      <a:round/>
+                      <a:headEnd type="none" w="med" len="med"/>
+                      <a:tailEnd type="none" w="med" len="med"/>
+                    </a:lnB>
+                  </a:tcPr>
+                </a:tc>
+                <a:tc>
+                  <a:txBody>
+                    <a:bodyPr anchor="t" rtlCol="false"/>
+                    <a:lstStyle/>
+                    <a:p>
+                      <a:pPr algn="ctr">
+                        <a:lnSpc>
+                          <a:spcPts val="4480"/>
+                        </a:lnSpc>
+                        <a:defRPr/>
+                      </a:pPr>
+                      <a:r>
+                        <a:rPr lang="en-US" sz="3200">
+                          <a:solidFill>
+                            <a:srgbClr val="0453F1"/>
+                          </a:solidFill>
+                          <a:latin typeface="IBM Plex Sans"/>
+                        </a:rPr>
+                        <a:t>hhp8@somaiya.edu</a:t>
+                      </a:r>
+                      <a:endParaRPr lang="en-US" sz="1100"/>
+                    </a:p>
+                  </a:txBody>
+                  <a:tcPr marL="190500" marR="190500" marT="190500" marB="190500" anchor="ctr">
+                    <a:lnL cmpd="sng" algn="ctr" cap="flat" w="19050">
+                      <a:solidFill>
+                        <a:srgbClr val="0453F1"/>
+                      </a:solidFill>
+                      <a:prstDash val="solid"/>
+                      <a:round/>
+                      <a:headEnd type="none" w="med" len="med"/>
+                      <a:tailEnd type="none" w="med" len="med"/>
+                    </a:lnL>
+                    <a:lnR cmpd="sng" algn="ctr" cap="flat" w="19050">
+                      <a:solidFill>
+                        <a:srgbClr val="0453F1"/>
+                      </a:solidFill>
+                      <a:prstDash val="solid"/>
+                      <a:round/>
+                      <a:headEnd type="none" w="med" len="med"/>
+                      <a:tailEnd type="none" w="med" len="med"/>
+                    </a:lnR>
+                    <a:lnT cmpd="sng" algn="ctr" cap="flat" w="19050">
+                      <a:solidFill>
+                        <a:srgbClr val="0453F1"/>
+                      </a:solidFill>
+                      <a:prstDash val="solid"/>
+                      <a:round/>
+                      <a:headEnd type="none" w="med" len="med"/>
+                      <a:tailEnd type="none" w="med" len="med"/>
+                    </a:lnT>
+                    <a:lnB cmpd="sng" algn="ctr" cap="flat" w="19050">
+                      <a:solidFill>
+                        <a:srgbClr val="0453F1"/>
+                      </a:solidFill>
+                      <a:prstDash val="solid"/>
+                      <a:round/>
+                      <a:headEnd type="none" w="med" len="med"/>
+                      <a:tailEnd type="none" w="med" len="med"/>
+                    </a:lnB>
+                  </a:tcPr>
+                </a:tc>
+              </a:tr>
+              <a:tr h="1060450">
                 <a:tc>
                   <a:txBody>
                     <a:bodyPr anchor="t" rtlCol="false"/>
@@ -5367,7 +5555,7 @@
                   </a:tcPr>
                 </a:tc>
               </a:tr>
-              <a:tr h="1061085">
+              <a:tr h="1060450">
                 <a:tc>
                   <a:txBody>
                     <a:bodyPr anchor="t" rtlCol="false"/>
@@ -5555,7 +5743,7 @@
                   </a:tcPr>
                 </a:tc>
               </a:tr>
-              <a:tr h="1061085">
+              <a:tr h="1060450">
                 <a:tc>
                   <a:txBody>
                     <a:bodyPr anchor="t" rtlCol="false"/>
@@ -5743,7 +5931,7 @@
                   </a:tcPr>
                 </a:tc>
               </a:tr>
-              <a:tr h="1061085">
+              <a:tr h="1060450">
                 <a:tc>
                   <a:txBody>
                     <a:bodyPr anchor="t" rtlCol="false"/>

</xml_diff>